<commit_message>
Deploying to gh-pages from @ spetrosi/release_automation_devconf2023@c5e062418cc88d4df0856d935454fe9a158a4a55 🚀
</commit_message>
<xml_diff>
--- a/README.pptx
+++ b/README.pptx
@@ -7,9 +7,15 @@
   <p:sldIdLst>
     <p:sldId id="256" r:id="rId2"/>
     <p:sldId id="257" r:id="rId3"/>
+    <p:sldId id="258" r:id="rId4"/>
+    <p:sldId id="259" r:id="rId5"/>
+    <p:sldId id="260" r:id="rId6"/>
+    <p:sldId id="261" r:id="rId7"/>
+    <p:sldId id="262" r:id="rId8"/>
+    <p:sldId id="263" r:id="rId9"/>
   </p:sldIdLst>
   <p:notesMasterIdLst>
-    <p:notesMasterId r:id="rId4"/>
+    <p:notesMasterId r:id="rId10"/>
   </p:notesMasterIdLst>
   <p:sldSz cx="12192000" cy="6858000"/>
   <p:notesSz cx="6858000" cy="12192000"/>
@@ -503,8 +509,7 @@
           <a:p>
             <a:r>
               <a:rPr lang="en-US" dirty="0"/>
-              <a:t>Comments for the slide for the presenters
-For slies syntax examples use https://github.com/ralexander-phi/marp-to-pages/blob/main/README.md and https://github.com/spetrosi/jak_psat_moderni_ucebnice/blob/dev/README.md</a:t>
+              <a:t/>
             </a:r>
             <a:endParaRPr lang="en-US" dirty="0"/>
           </a:p>
@@ -592,6 +597,96 @@
           <a:p>
             <a:r>
               <a:rPr lang="en-US" dirty="0"/>
+              <a:t>Being able to automate the low level, labor intensive parts of project management is critical. There are many tools in the Fedora and Github ecosystems that facilitate project management, such as GitHub Actions, Packit, and more. Learn how the Linux System Roles team leveraged these tools to perform:
+Comments for the slide for the presenters
+For slies syntax examples use https://github.com/ralexander-phi/marp-to-pages/blob/main/README.md and https://github.com/spetrosi/jak_psat_moderni_ucebnice/blob/dev/README.md</a:t>
+            </a:r>
+            <a:endParaRPr lang="en-US" dirty="0"/>
+          </a:p>
+        </p:txBody>
+      </p:sp>
+      <p:sp>
+        <p:nvSpPr>
+          <p:cNvPr id="4" name="Slide Number Placeholder 3"/>
+          <p:cNvSpPr>
+            <a:spLocks noGrp="1"/>
+          </p:cNvSpPr>
+          <p:nvPr>
+            <p:ph type="sldNum" sz="quarter" idx="10"/>
+          </p:nvPr>
+        </p:nvSpPr>
+        <p:spPr/>
+        <p:txBody>
+          <a:bodyPr/>
+          <a:lstStyle/>
+          <a:p>
+            <a:fld id="{F7021451-1387-4CA6-816F-3879F97B5CBC}" type="slidenum">
+              <a:rPr lang="en-US"/>
+              <a:t>2</a:t>
+            </a:fld>
+            <a:endParaRPr lang="en-US"/>
+          </a:p>
+        </p:txBody>
+      </p:sp>
+    </p:spTree>
+    <p:extLst>
+      <p:ext uri="{BB962C8B-B14F-4D97-AF65-F5344CB8AC3E}">
+        <p14:creationId xmlns:p14="http://schemas.microsoft.com/office/powerpoint/2010/main" val="1024086991"/>
+      </p:ext>
+    </p:extLst>
+  </p:cSld>
+  <p:clrMapOvr>
+    <a:masterClrMapping/>
+  </p:clrMapOvr>
+</p:notes>
+</file>
+
+<file path=ppt/notesSlides/notesSlide3.xml><?xml version="1.0" encoding="utf-8"?>
+<p:notes xmlns:a="http://schemas.openxmlformats.org/drawingml/2006/main" xmlns:r="http://schemas.openxmlformats.org/officeDocument/2006/relationships" xmlns:p="http://schemas.openxmlformats.org/presentationml/2006/main">
+  <p:cSld>
+    <p:spTree>
+      <p:nvGrpSpPr>
+        <p:cNvPr id="1" name=""/>
+        <p:cNvGrpSpPr/>
+        <p:nvPr/>
+      </p:nvGrpSpPr>
+      <p:grpSpPr>
+        <a:xfrm>
+          <a:off x="0" y="0"/>
+          <a:ext cx="0" cy="0"/>
+          <a:chOff x="0" y="0"/>
+          <a:chExt cx="0" cy="0"/>
+        </a:xfrm>
+      </p:grpSpPr>
+      <p:sp>
+        <p:nvSpPr>
+          <p:cNvPr id="2" name="Slide Image Placeholder 1"/>
+          <p:cNvSpPr>
+            <a:spLocks noGrp="1" noRot="1" noChangeAspect="1"/>
+          </p:cNvSpPr>
+          <p:nvPr>
+            <p:ph type="sldImg"/>
+          </p:nvPr>
+        </p:nvSpPr>
+        <p:spPr/>
+      </p:sp>
+      <p:sp>
+        <p:nvSpPr>
+          <p:cNvPr id="3" name="Notes Placeholder 2"/>
+          <p:cNvSpPr>
+            <a:spLocks noGrp="1"/>
+          </p:cNvSpPr>
+          <p:nvPr>
+            <p:ph type="body" idx="1"/>
+          </p:nvPr>
+        </p:nvSpPr>
+        <p:spPr/>
+        <p:txBody>
+          <a:bodyPr/>
+          <a:lstStyle/>
+          <a:p>
+            <a:r>
+              <a:rPr lang="en-US" dirty="0"/>
               <a:t/>
             </a:r>
             <a:endParaRPr lang="en-US" dirty="0"/>
@@ -615,7 +710,449 @@
           <a:p>
             <a:fld id="{F7021451-1387-4CA6-816F-3879F97B5CBC}" type="slidenum">
               <a:rPr lang="en-US"/>
-              <a:t>2</a:t>
+              <a:t>3</a:t>
+            </a:fld>
+            <a:endParaRPr lang="en-US"/>
+          </a:p>
+        </p:txBody>
+      </p:sp>
+    </p:spTree>
+    <p:extLst>
+      <p:ext uri="{BB962C8B-B14F-4D97-AF65-F5344CB8AC3E}">
+        <p14:creationId xmlns:p14="http://schemas.microsoft.com/office/powerpoint/2010/main" val="1024086991"/>
+      </p:ext>
+    </p:extLst>
+  </p:cSld>
+  <p:clrMapOvr>
+    <a:masterClrMapping/>
+  </p:clrMapOvr>
+</p:notes>
+</file>
+
+<file path=ppt/notesSlides/notesSlide4.xml><?xml version="1.0" encoding="utf-8"?>
+<p:notes xmlns:a="http://schemas.openxmlformats.org/drawingml/2006/main" xmlns:r="http://schemas.openxmlformats.org/officeDocument/2006/relationships" xmlns:p="http://schemas.openxmlformats.org/presentationml/2006/main">
+  <p:cSld>
+    <p:spTree>
+      <p:nvGrpSpPr>
+        <p:cNvPr id="1" name=""/>
+        <p:cNvGrpSpPr/>
+        <p:nvPr/>
+      </p:nvGrpSpPr>
+      <p:grpSpPr>
+        <a:xfrm>
+          <a:off x="0" y="0"/>
+          <a:ext cx="0" cy="0"/>
+          <a:chOff x="0" y="0"/>
+          <a:chExt cx="0" cy="0"/>
+        </a:xfrm>
+      </p:grpSpPr>
+      <p:sp>
+        <p:nvSpPr>
+          <p:cNvPr id="2" name="Slide Image Placeholder 1"/>
+          <p:cNvSpPr>
+            <a:spLocks noGrp="1" noRot="1" noChangeAspect="1"/>
+          </p:cNvSpPr>
+          <p:nvPr>
+            <p:ph type="sldImg"/>
+          </p:nvPr>
+        </p:nvSpPr>
+        <p:spPr/>
+      </p:sp>
+      <p:sp>
+        <p:nvSpPr>
+          <p:cNvPr id="3" name="Notes Placeholder 2"/>
+          <p:cNvSpPr>
+            <a:spLocks noGrp="1"/>
+          </p:cNvSpPr>
+          <p:nvPr>
+            <p:ph type="body" idx="1"/>
+          </p:nvPr>
+        </p:nvSpPr>
+        <p:spPr/>
+        <p:txBody>
+          <a:bodyPr/>
+          <a:lstStyle/>
+          <a:p>
+            <a:r>
+              <a:rPr lang="en-US" dirty="0"/>
+              <a:t/>
+            </a:r>
+            <a:endParaRPr lang="en-US" dirty="0"/>
+          </a:p>
+        </p:txBody>
+      </p:sp>
+      <p:sp>
+        <p:nvSpPr>
+          <p:cNvPr id="4" name="Slide Number Placeholder 3"/>
+          <p:cNvSpPr>
+            <a:spLocks noGrp="1"/>
+          </p:cNvSpPr>
+          <p:nvPr>
+            <p:ph type="sldNum" sz="quarter" idx="10"/>
+          </p:nvPr>
+        </p:nvSpPr>
+        <p:spPr/>
+        <p:txBody>
+          <a:bodyPr/>
+          <a:lstStyle/>
+          <a:p>
+            <a:fld id="{F7021451-1387-4CA6-816F-3879F97B5CBC}" type="slidenum">
+              <a:rPr lang="en-US"/>
+              <a:t>4</a:t>
+            </a:fld>
+            <a:endParaRPr lang="en-US"/>
+          </a:p>
+        </p:txBody>
+      </p:sp>
+    </p:spTree>
+    <p:extLst>
+      <p:ext uri="{BB962C8B-B14F-4D97-AF65-F5344CB8AC3E}">
+        <p14:creationId xmlns:p14="http://schemas.microsoft.com/office/powerpoint/2010/main" val="1024086991"/>
+      </p:ext>
+    </p:extLst>
+  </p:cSld>
+  <p:clrMapOvr>
+    <a:masterClrMapping/>
+  </p:clrMapOvr>
+</p:notes>
+</file>
+
+<file path=ppt/notesSlides/notesSlide5.xml><?xml version="1.0" encoding="utf-8"?>
+<p:notes xmlns:a="http://schemas.openxmlformats.org/drawingml/2006/main" xmlns:r="http://schemas.openxmlformats.org/officeDocument/2006/relationships" xmlns:p="http://schemas.openxmlformats.org/presentationml/2006/main">
+  <p:cSld>
+    <p:spTree>
+      <p:nvGrpSpPr>
+        <p:cNvPr id="1" name=""/>
+        <p:cNvGrpSpPr/>
+        <p:nvPr/>
+      </p:nvGrpSpPr>
+      <p:grpSpPr>
+        <a:xfrm>
+          <a:off x="0" y="0"/>
+          <a:ext cx="0" cy="0"/>
+          <a:chOff x="0" y="0"/>
+          <a:chExt cx="0" cy="0"/>
+        </a:xfrm>
+      </p:grpSpPr>
+      <p:sp>
+        <p:nvSpPr>
+          <p:cNvPr id="2" name="Slide Image Placeholder 1"/>
+          <p:cNvSpPr>
+            <a:spLocks noGrp="1" noRot="1" noChangeAspect="1"/>
+          </p:cNvSpPr>
+          <p:nvPr>
+            <p:ph type="sldImg"/>
+          </p:nvPr>
+        </p:nvSpPr>
+        <p:spPr/>
+      </p:sp>
+      <p:sp>
+        <p:nvSpPr>
+          <p:cNvPr id="3" name="Notes Placeholder 2"/>
+          <p:cNvSpPr>
+            <a:spLocks noGrp="1"/>
+          </p:cNvSpPr>
+          <p:nvPr>
+            <p:ph type="body" idx="1"/>
+          </p:nvPr>
+        </p:nvSpPr>
+        <p:spPr/>
+        <p:txBody>
+          <a:bodyPr/>
+          <a:lstStyle/>
+          <a:p>
+            <a:r>
+              <a:rPr lang="en-US" dirty="0"/>
+              <a:t>We have a GitHub action that we run when we want to create a new release. This action does the following:
+3. Pushes a new repository version and tag into GitHub</a:t>
+            </a:r>
+            <a:endParaRPr lang="en-US" dirty="0"/>
+          </a:p>
+        </p:txBody>
+      </p:sp>
+      <p:sp>
+        <p:nvSpPr>
+          <p:cNvPr id="4" name="Slide Number Placeholder 3"/>
+          <p:cNvSpPr>
+            <a:spLocks noGrp="1"/>
+          </p:cNvSpPr>
+          <p:nvPr>
+            <p:ph type="sldNum" sz="quarter" idx="10"/>
+          </p:nvPr>
+        </p:nvSpPr>
+        <p:spPr/>
+        <p:txBody>
+          <a:bodyPr/>
+          <a:lstStyle/>
+          <a:p>
+            <a:fld id="{F7021451-1387-4CA6-816F-3879F97B5CBC}" type="slidenum">
+              <a:rPr lang="en-US"/>
+              <a:t>5</a:t>
+            </a:fld>
+            <a:endParaRPr lang="en-US"/>
+          </a:p>
+        </p:txBody>
+      </p:sp>
+    </p:spTree>
+    <p:extLst>
+      <p:ext uri="{BB962C8B-B14F-4D97-AF65-F5344CB8AC3E}">
+        <p14:creationId xmlns:p14="http://schemas.microsoft.com/office/powerpoint/2010/main" val="1024086991"/>
+      </p:ext>
+    </p:extLst>
+  </p:cSld>
+  <p:clrMapOvr>
+    <a:masterClrMapping/>
+  </p:clrMapOvr>
+</p:notes>
+</file>
+
+<file path=ppt/notesSlides/notesSlide6.xml><?xml version="1.0" encoding="utf-8"?>
+<p:notes xmlns:a="http://schemas.openxmlformats.org/drawingml/2006/main" xmlns:r="http://schemas.openxmlformats.org/officeDocument/2006/relationships" xmlns:p="http://schemas.openxmlformats.org/presentationml/2006/main">
+  <p:cSld>
+    <p:spTree>
+      <p:nvGrpSpPr>
+        <p:cNvPr id="1" name=""/>
+        <p:cNvGrpSpPr/>
+        <p:nvPr/>
+      </p:nvGrpSpPr>
+      <p:grpSpPr>
+        <a:xfrm>
+          <a:off x="0" y="0"/>
+          <a:ext cx="0" cy="0"/>
+          <a:chOff x="0" y="0"/>
+          <a:chExt cx="0" cy="0"/>
+        </a:xfrm>
+      </p:grpSpPr>
+      <p:sp>
+        <p:nvSpPr>
+          <p:cNvPr id="2" name="Slide Image Placeholder 1"/>
+          <p:cNvSpPr>
+            <a:spLocks noGrp="1" noRot="1" noChangeAspect="1"/>
+          </p:cNvSpPr>
+          <p:nvPr>
+            <p:ph type="sldImg"/>
+          </p:nvPr>
+        </p:nvSpPr>
+        <p:spPr/>
+      </p:sp>
+      <p:sp>
+        <p:nvSpPr>
+          <p:cNvPr id="3" name="Notes Placeholder 2"/>
+          <p:cNvSpPr>
+            <a:spLocks noGrp="1"/>
+          </p:cNvSpPr>
+          <p:nvPr>
+            <p:ph type="body" idx="1"/>
+          </p:nvPr>
+        </p:nvSpPr>
+        <p:spPr/>
+        <p:txBody>
+          <a:bodyPr/>
+          <a:lstStyle/>
+          <a:p>
+            <a:r>
+              <a:rPr lang="en-US" dirty="0"/>
+              <a:t>In our case, publishes the role to Ansible Galaxy.
+It can also by PyPi etc.</a:t>
+            </a:r>
+            <a:endParaRPr lang="en-US" dirty="0"/>
+          </a:p>
+        </p:txBody>
+      </p:sp>
+      <p:sp>
+        <p:nvSpPr>
+          <p:cNvPr id="4" name="Slide Number Placeholder 3"/>
+          <p:cNvSpPr>
+            <a:spLocks noGrp="1"/>
+          </p:cNvSpPr>
+          <p:nvPr>
+            <p:ph type="sldNum" sz="quarter" idx="10"/>
+          </p:nvPr>
+        </p:nvSpPr>
+        <p:spPr/>
+        <p:txBody>
+          <a:bodyPr/>
+          <a:lstStyle/>
+          <a:p>
+            <a:fld id="{F7021451-1387-4CA6-816F-3879F97B5CBC}" type="slidenum">
+              <a:rPr lang="en-US"/>
+              <a:t>6</a:t>
+            </a:fld>
+            <a:endParaRPr lang="en-US"/>
+          </a:p>
+        </p:txBody>
+      </p:sp>
+    </p:spTree>
+    <p:extLst>
+      <p:ext uri="{BB962C8B-B14F-4D97-AF65-F5344CB8AC3E}">
+        <p14:creationId xmlns:p14="http://schemas.microsoft.com/office/powerpoint/2010/main" val="1024086991"/>
+      </p:ext>
+    </p:extLst>
+  </p:cSld>
+  <p:clrMapOvr>
+    <a:masterClrMapping/>
+  </p:clrMapOvr>
+</p:notes>
+</file>
+
+<file path=ppt/notesSlides/notesSlide7.xml><?xml version="1.0" encoding="utf-8"?>
+<p:notes xmlns:a="http://schemas.openxmlformats.org/drawingml/2006/main" xmlns:r="http://schemas.openxmlformats.org/officeDocument/2006/relationships" xmlns:p="http://schemas.openxmlformats.org/presentationml/2006/main">
+  <p:cSld>
+    <p:spTree>
+      <p:nvGrpSpPr>
+        <p:cNvPr id="1" name=""/>
+        <p:cNvGrpSpPr/>
+        <p:nvPr/>
+      </p:nvGrpSpPr>
+      <p:grpSpPr>
+        <a:xfrm>
+          <a:off x="0" y="0"/>
+          <a:ext cx="0" cy="0"/>
+          <a:chOff x="0" y="0"/>
+          <a:chExt cx="0" cy="0"/>
+        </a:xfrm>
+      </p:grpSpPr>
+      <p:sp>
+        <p:nvSpPr>
+          <p:cNvPr id="2" name="Slide Image Placeholder 1"/>
+          <p:cNvSpPr>
+            <a:spLocks noGrp="1" noRot="1" noChangeAspect="1"/>
+          </p:cNvSpPr>
+          <p:nvPr>
+            <p:ph type="sldImg"/>
+          </p:nvPr>
+        </p:nvSpPr>
+        <p:spPr/>
+      </p:sp>
+      <p:sp>
+        <p:nvSpPr>
+          <p:cNvPr id="3" name="Notes Placeholder 2"/>
+          <p:cNvSpPr>
+            <a:spLocks noGrp="1"/>
+          </p:cNvSpPr>
+          <p:nvPr>
+            <p:ph type="body" idx="1"/>
+          </p:nvPr>
+        </p:nvSpPr>
+        <p:spPr/>
+        <p:txBody>
+          <a:bodyPr/>
+          <a:lstStyle/>
+          <a:p>
+            <a:r>
+              <a:rPr lang="en-US" dirty="0"/>
+              <a:t>In our case, multiple roles are built into a fedora.linux_system_roles collection and published to Galaxy</a:t>
+            </a:r>
+            <a:endParaRPr lang="en-US" dirty="0"/>
+          </a:p>
+        </p:txBody>
+      </p:sp>
+      <p:sp>
+        <p:nvSpPr>
+          <p:cNvPr id="4" name="Slide Number Placeholder 3"/>
+          <p:cNvSpPr>
+            <a:spLocks noGrp="1"/>
+          </p:cNvSpPr>
+          <p:nvPr>
+            <p:ph type="sldNum" sz="quarter" idx="10"/>
+          </p:nvPr>
+        </p:nvSpPr>
+        <p:spPr/>
+        <p:txBody>
+          <a:bodyPr/>
+          <a:lstStyle/>
+          <a:p>
+            <a:fld id="{F7021451-1387-4CA6-816F-3879F97B5CBC}" type="slidenum">
+              <a:rPr lang="en-US"/>
+              <a:t>7</a:t>
+            </a:fld>
+            <a:endParaRPr lang="en-US"/>
+          </a:p>
+        </p:txBody>
+      </p:sp>
+    </p:spTree>
+    <p:extLst>
+      <p:ext uri="{BB962C8B-B14F-4D97-AF65-F5344CB8AC3E}">
+        <p14:creationId xmlns:p14="http://schemas.microsoft.com/office/powerpoint/2010/main" val="1024086991"/>
+      </p:ext>
+    </p:extLst>
+  </p:cSld>
+  <p:clrMapOvr>
+    <a:masterClrMapping/>
+  </p:clrMapOvr>
+</p:notes>
+</file>
+
+<file path=ppt/notesSlides/notesSlide8.xml><?xml version="1.0" encoding="utf-8"?>
+<p:notes xmlns:a="http://schemas.openxmlformats.org/drawingml/2006/main" xmlns:r="http://schemas.openxmlformats.org/officeDocument/2006/relationships" xmlns:p="http://schemas.openxmlformats.org/presentationml/2006/main">
+  <p:cSld>
+    <p:spTree>
+      <p:nvGrpSpPr>
+        <p:cNvPr id="1" name=""/>
+        <p:cNvGrpSpPr/>
+        <p:nvPr/>
+      </p:nvGrpSpPr>
+      <p:grpSpPr>
+        <a:xfrm>
+          <a:off x="0" y="0"/>
+          <a:ext cx="0" cy="0"/>
+          <a:chOff x="0" y="0"/>
+          <a:chExt cx="0" cy="0"/>
+        </a:xfrm>
+      </p:grpSpPr>
+      <p:sp>
+        <p:nvSpPr>
+          <p:cNvPr id="2" name="Slide Image Placeholder 1"/>
+          <p:cNvSpPr>
+            <a:spLocks noGrp="1" noRot="1" noChangeAspect="1"/>
+          </p:cNvSpPr>
+          <p:nvPr>
+            <p:ph type="sldImg"/>
+          </p:nvPr>
+        </p:nvSpPr>
+        <p:spPr/>
+      </p:sp>
+      <p:sp>
+        <p:nvSpPr>
+          <p:cNvPr id="3" name="Notes Placeholder 2"/>
+          <p:cNvSpPr>
+            <a:spLocks noGrp="1"/>
+          </p:cNvSpPr>
+          <p:nvPr>
+            <p:ph type="body" idx="1"/>
+          </p:nvPr>
+        </p:nvSpPr>
+        <p:spPr/>
+        <p:txBody>
+          <a:bodyPr/>
+          <a:lstStyle/>
+          <a:p>
+            <a:r>
+              <a:rPr lang="en-US" dirty="0"/>
+              <a:t/>
+            </a:r>
+            <a:endParaRPr lang="en-US" dirty="0"/>
+          </a:p>
+        </p:txBody>
+      </p:sp>
+      <p:sp>
+        <p:nvSpPr>
+          <p:cNvPr id="4" name="Slide Number Placeholder 3"/>
+          <p:cNvSpPr>
+            <a:spLocks noGrp="1"/>
+          </p:cNvSpPr>
+          <p:nvPr>
+            <p:ph type="sldNum" sz="quarter" idx="10"/>
+          </p:nvPr>
+        </p:nvSpPr>
+        <p:spPr/>
+        <p:txBody>
+          <a:bodyPr/>
+          <a:lstStyle/>
+          <a:p>
+            <a:fld id="{F7021451-1387-4CA6-816F-3879F97B5CBC}" type="slidenum">
+              <a:rPr lang="en-US"/>
+              <a:t>8</a:t>
             </a:fld>
             <a:endParaRPr lang="en-US"/>
           </a:p>
@@ -983,6 +1520,240 @@
 <file path=ppt/slides/slide2.xml><?xml version="1.0" encoding="utf-8"?>
 <p:sld xmlns:a="http://schemas.openxmlformats.org/drawingml/2006/main" xmlns:r="http://schemas.openxmlformats.org/officeDocument/2006/relationships" xmlns:p="http://schemas.openxmlformats.org/presentationml/2006/main">
   <p:cSld name="Slide 2">
+    <p:bg>
+      <p:bgPr>
+        <a:blipFill dpi="0" rotWithShape="1">
+          <a:blip r:embed="rId1">
+            <a:lum/>
+          </a:blip>
+          <a:srcRect/>
+          <a:stretch>
+            <a:fillRect/>
+          </a:stretch>
+        </a:blipFill>
+        <a:effectLst/>
+      </p:bgPr>
+    </p:bg>
+    <p:spTree>
+      <p:nvGrpSpPr>
+        <p:cNvPr id="1" name=""/>
+        <p:cNvGrpSpPr/>
+        <p:nvPr/>
+      </p:nvGrpSpPr>
+      <p:grpSpPr>
+        <a:xfrm>
+          <a:off x="0" y="0"/>
+          <a:ext cx="0" cy="0"/>
+          <a:chOff x="0" y="0"/>
+          <a:chExt cx="0" cy="0"/>
+        </a:xfrm>
+      </p:grpSpPr>
+    </p:spTree>
+  </p:cSld>
+  <p:clrMapOvr>
+    <a:masterClrMapping/>
+  </p:clrMapOvr>
+</p:sld>
+</file>
+
+<file path=ppt/slides/slide3.xml><?xml version="1.0" encoding="utf-8"?>
+<p:sld xmlns:a="http://schemas.openxmlformats.org/drawingml/2006/main" xmlns:r="http://schemas.openxmlformats.org/officeDocument/2006/relationships" xmlns:p="http://schemas.openxmlformats.org/presentationml/2006/main">
+  <p:cSld name="Slide 3">
+    <p:bg>
+      <p:bgPr>
+        <a:blipFill dpi="0" rotWithShape="1">
+          <a:blip r:embed="rId1">
+            <a:lum/>
+          </a:blip>
+          <a:srcRect/>
+          <a:stretch>
+            <a:fillRect/>
+          </a:stretch>
+        </a:blipFill>
+        <a:effectLst/>
+      </p:bgPr>
+    </p:bg>
+    <p:spTree>
+      <p:nvGrpSpPr>
+        <p:cNvPr id="1" name=""/>
+        <p:cNvGrpSpPr/>
+        <p:nvPr/>
+      </p:nvGrpSpPr>
+      <p:grpSpPr>
+        <a:xfrm>
+          <a:off x="0" y="0"/>
+          <a:ext cx="0" cy="0"/>
+          <a:chOff x="0" y="0"/>
+          <a:chExt cx="0" cy="0"/>
+        </a:xfrm>
+      </p:grpSpPr>
+    </p:spTree>
+  </p:cSld>
+  <p:clrMapOvr>
+    <a:masterClrMapping/>
+  </p:clrMapOvr>
+</p:sld>
+</file>
+
+<file path=ppt/slides/slide4.xml><?xml version="1.0" encoding="utf-8"?>
+<p:sld xmlns:a="http://schemas.openxmlformats.org/drawingml/2006/main" xmlns:r="http://schemas.openxmlformats.org/officeDocument/2006/relationships" xmlns:p="http://schemas.openxmlformats.org/presentationml/2006/main">
+  <p:cSld name="Slide 4">
+    <p:bg>
+      <p:bgPr>
+        <a:blipFill dpi="0" rotWithShape="1">
+          <a:blip r:embed="rId1">
+            <a:lum/>
+          </a:blip>
+          <a:srcRect/>
+          <a:stretch>
+            <a:fillRect/>
+          </a:stretch>
+        </a:blipFill>
+        <a:effectLst/>
+      </p:bgPr>
+    </p:bg>
+    <p:spTree>
+      <p:nvGrpSpPr>
+        <p:cNvPr id="1" name=""/>
+        <p:cNvGrpSpPr/>
+        <p:nvPr/>
+      </p:nvGrpSpPr>
+      <p:grpSpPr>
+        <a:xfrm>
+          <a:off x="0" y="0"/>
+          <a:ext cx="0" cy="0"/>
+          <a:chOff x="0" y="0"/>
+          <a:chExt cx="0" cy="0"/>
+        </a:xfrm>
+      </p:grpSpPr>
+    </p:spTree>
+  </p:cSld>
+  <p:clrMapOvr>
+    <a:masterClrMapping/>
+  </p:clrMapOvr>
+</p:sld>
+</file>
+
+<file path=ppt/slides/slide5.xml><?xml version="1.0" encoding="utf-8"?>
+<p:sld xmlns:a="http://schemas.openxmlformats.org/drawingml/2006/main" xmlns:r="http://schemas.openxmlformats.org/officeDocument/2006/relationships" xmlns:p="http://schemas.openxmlformats.org/presentationml/2006/main">
+  <p:cSld name="Slide 5">
+    <p:bg>
+      <p:bgPr>
+        <a:blipFill dpi="0" rotWithShape="1">
+          <a:blip r:embed="rId1">
+            <a:lum/>
+          </a:blip>
+          <a:srcRect/>
+          <a:stretch>
+            <a:fillRect/>
+          </a:stretch>
+        </a:blipFill>
+        <a:effectLst/>
+      </p:bgPr>
+    </p:bg>
+    <p:spTree>
+      <p:nvGrpSpPr>
+        <p:cNvPr id="1" name=""/>
+        <p:cNvGrpSpPr/>
+        <p:nvPr/>
+      </p:nvGrpSpPr>
+      <p:grpSpPr>
+        <a:xfrm>
+          <a:off x="0" y="0"/>
+          <a:ext cx="0" cy="0"/>
+          <a:chOff x="0" y="0"/>
+          <a:chExt cx="0" cy="0"/>
+        </a:xfrm>
+      </p:grpSpPr>
+    </p:spTree>
+  </p:cSld>
+  <p:clrMapOvr>
+    <a:masterClrMapping/>
+  </p:clrMapOvr>
+</p:sld>
+</file>
+
+<file path=ppt/slides/slide6.xml><?xml version="1.0" encoding="utf-8"?>
+<p:sld xmlns:a="http://schemas.openxmlformats.org/drawingml/2006/main" xmlns:r="http://schemas.openxmlformats.org/officeDocument/2006/relationships" xmlns:p="http://schemas.openxmlformats.org/presentationml/2006/main">
+  <p:cSld name="Slide 6">
+    <p:bg>
+      <p:bgPr>
+        <a:blipFill dpi="0" rotWithShape="1">
+          <a:blip r:embed="rId1">
+            <a:lum/>
+          </a:blip>
+          <a:srcRect/>
+          <a:stretch>
+            <a:fillRect/>
+          </a:stretch>
+        </a:blipFill>
+        <a:effectLst/>
+      </p:bgPr>
+    </p:bg>
+    <p:spTree>
+      <p:nvGrpSpPr>
+        <p:cNvPr id="1" name=""/>
+        <p:cNvGrpSpPr/>
+        <p:nvPr/>
+      </p:nvGrpSpPr>
+      <p:grpSpPr>
+        <a:xfrm>
+          <a:off x="0" y="0"/>
+          <a:ext cx="0" cy="0"/>
+          <a:chOff x="0" y="0"/>
+          <a:chExt cx="0" cy="0"/>
+        </a:xfrm>
+      </p:grpSpPr>
+    </p:spTree>
+  </p:cSld>
+  <p:clrMapOvr>
+    <a:masterClrMapping/>
+  </p:clrMapOvr>
+</p:sld>
+</file>
+
+<file path=ppt/slides/slide7.xml><?xml version="1.0" encoding="utf-8"?>
+<p:sld xmlns:a="http://schemas.openxmlformats.org/drawingml/2006/main" xmlns:r="http://schemas.openxmlformats.org/officeDocument/2006/relationships" xmlns:p="http://schemas.openxmlformats.org/presentationml/2006/main">
+  <p:cSld name="Slide 7">
+    <p:bg>
+      <p:bgPr>
+        <a:blipFill dpi="0" rotWithShape="1">
+          <a:blip r:embed="rId1">
+            <a:lum/>
+          </a:blip>
+          <a:srcRect/>
+          <a:stretch>
+            <a:fillRect/>
+          </a:stretch>
+        </a:blipFill>
+        <a:effectLst/>
+      </p:bgPr>
+    </p:bg>
+    <p:spTree>
+      <p:nvGrpSpPr>
+        <p:cNvPr id="1" name=""/>
+        <p:cNvGrpSpPr/>
+        <p:nvPr/>
+      </p:nvGrpSpPr>
+      <p:grpSpPr>
+        <a:xfrm>
+          <a:off x="0" y="0"/>
+          <a:ext cx="0" cy="0"/>
+          <a:chOff x="0" y="0"/>
+          <a:chExt cx="0" cy="0"/>
+        </a:xfrm>
+      </p:grpSpPr>
+    </p:spTree>
+  </p:cSld>
+  <p:clrMapOvr>
+    <a:masterClrMapping/>
+  </p:clrMapOvr>
+</p:sld>
+</file>
+
+<file path=ppt/slides/slide8.xml><?xml version="1.0" encoding="utf-8"?>
+<p:sld xmlns:a="http://schemas.openxmlformats.org/drawingml/2006/main" xmlns:r="http://schemas.openxmlformats.org/officeDocument/2006/relationships" xmlns:p="http://schemas.openxmlformats.org/presentationml/2006/main">
+  <p:cSld name="Slide 8">
     <p:bg>
       <p:bgPr>
         <a:blipFill dpi="0" rotWithShape="1">

</xml_diff>

<commit_message>
Deploying to gh-pages from @ spetrosi/release_automation_devconf2023@1c3c26c6f91fcdb32faef27e36b58377830c0673 🚀
</commit_message>
<xml_diff>
--- a/README.pptx
+++ b/README.pptx
@@ -13,9 +13,10 @@
     <p:sldId id="261" r:id="rId7"/>
     <p:sldId id="262" r:id="rId8"/>
     <p:sldId id="263" r:id="rId9"/>
+    <p:sldId id="264" r:id="rId10"/>
   </p:sldIdLst>
   <p:notesMasterIdLst>
-    <p:notesMasterId r:id="rId10"/>
+    <p:notesMasterId r:id="rId11"/>
   </p:notesMasterIdLst>
   <p:sldSz cx="12192000" cy="6858000"/>
   <p:notesSz cx="6858000" cy="12192000"/>
@@ -597,7 +598,8 @@
           <a:p>
             <a:r>
               <a:rPr lang="en-US" dirty="0"/>
-              <a:t>Being able to automate the low level, labor intensive parts of project management is critical. There are many tools in the Fedora and Github ecosystems that facilitate project management, such as GitHub Actions, Packit, and more. Learn how the Linux System Roles team leveraged these tools to perform:
+              <a:t>Being able to automate the low level, labor intensive parts of project management is critical. There are many tools in the Fedora and Github ecosystems that facilitate project management, such as GitHub workflows, Packit, and more.
+2. Automated Ansible collection build, publish and release to Galaxy
 Comments for the slide for the presenters
 For slies syntax examples use https://github.com/ralexander-phi/marp-to-pages/blob/main/README.md and https://github.com/spetrosi/jak_psat_moderni_ucebnice/blob/dev/README.md</a:t>
             </a:r>
@@ -687,7 +689,7 @@
           <a:p>
             <a:r>
               <a:rPr lang="en-US" dirty="0"/>
-              <a:t/>
+              <a:t>3. Cron-like daily GitHub workflow that collects and publishes content from multiple repositories if any repository has an update</a:t>
             </a:r>
             <a:endParaRPr lang="en-US" dirty="0"/>
           </a:p>
@@ -863,8 +865,7 @@
           <a:p>
             <a:r>
               <a:rPr lang="en-US" dirty="0"/>
-              <a:t>We have a GitHub action that we run when we want to create a new release. This action does the following:
-3. Pushes a new repository version and tag into GitHub</a:t>
+              <a:t/>
             </a:r>
             <a:endParaRPr lang="en-US" dirty="0"/>
           </a:p>
@@ -952,8 +953,7 @@
           <a:p>
             <a:r>
               <a:rPr lang="en-US" dirty="0"/>
-              <a:t>In our case, publishes the role to Ansible Galaxy.
-It can also by PyPi etc.</a:t>
+              <a:t/>
             </a:r>
             <a:endParaRPr lang="en-US" dirty="0"/>
           </a:p>
@@ -1041,7 +1041,7 @@
           <a:p>
             <a:r>
               <a:rPr lang="en-US" dirty="0"/>
-              <a:t>In our case, multiple roles are built into a fedora.linux_system_roles collection and published to Galaxy</a:t>
+              <a:t/>
             </a:r>
             <a:endParaRPr lang="en-US" dirty="0"/>
           </a:p>
@@ -1153,6 +1153,94 @@
             <a:fld id="{F7021451-1387-4CA6-816F-3879F97B5CBC}" type="slidenum">
               <a:rPr lang="en-US"/>
               <a:t>8</a:t>
+            </a:fld>
+            <a:endParaRPr lang="en-US"/>
+          </a:p>
+        </p:txBody>
+      </p:sp>
+    </p:spTree>
+    <p:extLst>
+      <p:ext uri="{BB962C8B-B14F-4D97-AF65-F5344CB8AC3E}">
+        <p14:creationId xmlns:p14="http://schemas.microsoft.com/office/powerpoint/2010/main" val="1024086991"/>
+      </p:ext>
+    </p:extLst>
+  </p:cSld>
+  <p:clrMapOvr>
+    <a:masterClrMapping/>
+  </p:clrMapOvr>
+</p:notes>
+</file>
+
+<file path=ppt/notesSlides/notesSlide9.xml><?xml version="1.0" encoding="utf-8"?>
+<p:notes xmlns:a="http://schemas.openxmlformats.org/drawingml/2006/main" xmlns:r="http://schemas.openxmlformats.org/officeDocument/2006/relationships" xmlns:p="http://schemas.openxmlformats.org/presentationml/2006/main">
+  <p:cSld>
+    <p:spTree>
+      <p:nvGrpSpPr>
+        <p:cNvPr id="1" name=""/>
+        <p:cNvGrpSpPr/>
+        <p:nvPr/>
+      </p:nvGrpSpPr>
+      <p:grpSpPr>
+        <a:xfrm>
+          <a:off x="0" y="0"/>
+          <a:ext cx="0" cy="0"/>
+          <a:chOff x="0" y="0"/>
+          <a:chExt cx="0" cy="0"/>
+        </a:xfrm>
+      </p:grpSpPr>
+      <p:sp>
+        <p:nvSpPr>
+          <p:cNvPr id="2" name="Slide Image Placeholder 1"/>
+          <p:cNvSpPr>
+            <a:spLocks noGrp="1" noRot="1" noChangeAspect="1"/>
+          </p:cNvSpPr>
+          <p:nvPr>
+            <p:ph type="sldImg"/>
+          </p:nvPr>
+        </p:nvSpPr>
+        <p:spPr/>
+      </p:sp>
+      <p:sp>
+        <p:nvSpPr>
+          <p:cNvPr id="3" name="Notes Placeholder 2"/>
+          <p:cNvSpPr>
+            <a:spLocks noGrp="1"/>
+          </p:cNvSpPr>
+          <p:nvPr>
+            <p:ph type="body" idx="1"/>
+          </p:nvPr>
+        </p:nvSpPr>
+        <p:spPr/>
+        <p:txBody>
+          <a:bodyPr/>
+          <a:lstStyle/>
+          <a:p>
+            <a:r>
+              <a:rPr lang="en-US" dirty="0"/>
+              <a:t/>
+            </a:r>
+            <a:endParaRPr lang="en-US" dirty="0"/>
+          </a:p>
+        </p:txBody>
+      </p:sp>
+      <p:sp>
+        <p:nvSpPr>
+          <p:cNvPr id="4" name="Slide Number Placeholder 3"/>
+          <p:cNvSpPr>
+            <a:spLocks noGrp="1"/>
+          </p:cNvSpPr>
+          <p:nvPr>
+            <p:ph type="sldNum" sz="quarter" idx="10"/>
+          </p:nvPr>
+        </p:nvSpPr>
+        <p:spPr/>
+        <p:txBody>
+          <a:bodyPr/>
+          <a:lstStyle/>
+          <a:p>
+            <a:fld id="{F7021451-1387-4CA6-816F-3879F97B5CBC}" type="slidenum">
+              <a:rPr lang="en-US"/>
+              <a:t>9</a:t>
             </a:fld>
             <a:endParaRPr lang="en-US"/>
           </a:p>
@@ -1790,6 +1878,45 @@
 </p:sld>
 </file>
 
+<file path=ppt/slides/slide9.xml><?xml version="1.0" encoding="utf-8"?>
+<p:sld xmlns:a="http://schemas.openxmlformats.org/drawingml/2006/main" xmlns:r="http://schemas.openxmlformats.org/officeDocument/2006/relationships" xmlns:p="http://schemas.openxmlformats.org/presentationml/2006/main">
+  <p:cSld name="Slide 9">
+    <p:bg>
+      <p:bgPr>
+        <a:blipFill dpi="0" rotWithShape="1">
+          <a:blip r:embed="rId1">
+            <a:lum/>
+          </a:blip>
+          <a:srcRect/>
+          <a:stretch>
+            <a:fillRect/>
+          </a:stretch>
+        </a:blipFill>
+        <a:effectLst/>
+      </p:bgPr>
+    </p:bg>
+    <p:spTree>
+      <p:nvGrpSpPr>
+        <p:cNvPr id="1" name=""/>
+        <p:cNvGrpSpPr/>
+        <p:nvPr/>
+      </p:nvGrpSpPr>
+      <p:grpSpPr>
+        <a:xfrm>
+          <a:off x="0" y="0"/>
+          <a:ext cx="0" cy="0"/>
+          <a:chOff x="0" y="0"/>
+          <a:chExt cx="0" cy="0"/>
+        </a:xfrm>
+      </p:grpSpPr>
+    </p:spTree>
+  </p:cSld>
+  <p:clrMapOvr>
+    <a:masterClrMapping/>
+  </p:clrMapOvr>
+</p:sld>
+</file>
+
 <file path=ppt/theme/theme1.xml><?xml version="1.0" encoding="utf-8"?>
 <a:theme xmlns:a="http://schemas.openxmlformats.org/drawingml/2006/main" name="Office Theme">
   <a:themeElements>

</xml_diff>

<commit_message>
Deploying to gh-pages from @ spetrosi/release_automation_devconf2023@e07e2bdb525e59588079575927d6d7792cbcbc90 🚀
</commit_message>
<xml_diff>
--- a/README.pptx
+++ b/README.pptx
@@ -14,9 +14,12 @@
     <p:sldId id="262" r:id="rId8"/>
     <p:sldId id="263" r:id="rId9"/>
     <p:sldId id="264" r:id="rId10"/>
+    <p:sldId id="265" r:id="rId11"/>
+    <p:sldId id="266" r:id="rId12"/>
+    <p:sldId id="267" r:id="rId13"/>
   </p:sldIdLst>
   <p:notesMasterIdLst>
-    <p:notesMasterId r:id="rId11"/>
+    <p:notesMasterId r:id="rId14"/>
   </p:notesMasterIdLst>
   <p:sldSz cx="12192000" cy="6858000"/>
   <p:notesSz cx="6858000" cy="12192000"/>
@@ -534,6 +537,270 @@
             <a:fld id="{F7021451-1387-4CA6-816F-3879F97B5CBC}" type="slidenum">
               <a:rPr lang="en-US"/>
               <a:t>1</a:t>
+            </a:fld>
+            <a:endParaRPr lang="en-US"/>
+          </a:p>
+        </p:txBody>
+      </p:sp>
+    </p:spTree>
+    <p:extLst>
+      <p:ext uri="{BB962C8B-B14F-4D97-AF65-F5344CB8AC3E}">
+        <p14:creationId xmlns:p14="http://schemas.microsoft.com/office/powerpoint/2010/main" val="1024086991"/>
+      </p:ext>
+    </p:extLst>
+  </p:cSld>
+  <p:clrMapOvr>
+    <a:masterClrMapping/>
+  </p:clrMapOvr>
+</p:notes>
+</file>
+
+<file path=ppt/notesSlides/notesSlide10.xml><?xml version="1.0" encoding="utf-8"?>
+<p:notes xmlns:a="http://schemas.openxmlformats.org/drawingml/2006/main" xmlns:r="http://schemas.openxmlformats.org/officeDocument/2006/relationships" xmlns:p="http://schemas.openxmlformats.org/presentationml/2006/main">
+  <p:cSld>
+    <p:spTree>
+      <p:nvGrpSpPr>
+        <p:cNvPr id="1" name=""/>
+        <p:cNvGrpSpPr/>
+        <p:nvPr/>
+      </p:nvGrpSpPr>
+      <p:grpSpPr>
+        <a:xfrm>
+          <a:off x="0" y="0"/>
+          <a:ext cx="0" cy="0"/>
+          <a:chOff x="0" y="0"/>
+          <a:chExt cx="0" cy="0"/>
+        </a:xfrm>
+      </p:grpSpPr>
+      <p:sp>
+        <p:nvSpPr>
+          <p:cNvPr id="2" name="Slide Image Placeholder 1"/>
+          <p:cNvSpPr>
+            <a:spLocks noGrp="1" noRot="1" noChangeAspect="1"/>
+          </p:cNvSpPr>
+          <p:nvPr>
+            <p:ph type="sldImg"/>
+          </p:nvPr>
+        </p:nvSpPr>
+        <p:spPr/>
+      </p:sp>
+      <p:sp>
+        <p:nvSpPr>
+          <p:cNvPr id="3" name="Notes Placeholder 2"/>
+          <p:cNvSpPr>
+            <a:spLocks noGrp="1"/>
+          </p:cNvSpPr>
+          <p:nvPr>
+            <p:ph type="body" idx="1"/>
+          </p:nvPr>
+        </p:nvSpPr>
+        <p:spPr/>
+        <p:txBody>
+          <a:bodyPr/>
+          <a:lstStyle/>
+          <a:p>
+            <a:r>
+              <a:rPr lang="en-US" dirty="0"/>
+              <a:t/>
+            </a:r>
+            <a:endParaRPr lang="en-US" dirty="0"/>
+          </a:p>
+        </p:txBody>
+      </p:sp>
+      <p:sp>
+        <p:nvSpPr>
+          <p:cNvPr id="4" name="Slide Number Placeholder 3"/>
+          <p:cNvSpPr>
+            <a:spLocks noGrp="1"/>
+          </p:cNvSpPr>
+          <p:nvPr>
+            <p:ph type="sldNum" sz="quarter" idx="10"/>
+          </p:nvPr>
+        </p:nvSpPr>
+        <p:spPr/>
+        <p:txBody>
+          <a:bodyPr/>
+          <a:lstStyle/>
+          <a:p>
+            <a:fld id="{F7021451-1387-4CA6-816F-3879F97B5CBC}" type="slidenum">
+              <a:rPr lang="en-US"/>
+              <a:t>10</a:t>
+            </a:fld>
+            <a:endParaRPr lang="en-US"/>
+          </a:p>
+        </p:txBody>
+      </p:sp>
+    </p:spTree>
+    <p:extLst>
+      <p:ext uri="{BB962C8B-B14F-4D97-AF65-F5344CB8AC3E}">
+        <p14:creationId xmlns:p14="http://schemas.microsoft.com/office/powerpoint/2010/main" val="1024086991"/>
+      </p:ext>
+    </p:extLst>
+  </p:cSld>
+  <p:clrMapOvr>
+    <a:masterClrMapping/>
+  </p:clrMapOvr>
+</p:notes>
+</file>
+
+<file path=ppt/notesSlides/notesSlide11.xml><?xml version="1.0" encoding="utf-8"?>
+<p:notes xmlns:a="http://schemas.openxmlformats.org/drawingml/2006/main" xmlns:r="http://schemas.openxmlformats.org/officeDocument/2006/relationships" xmlns:p="http://schemas.openxmlformats.org/presentationml/2006/main">
+  <p:cSld>
+    <p:spTree>
+      <p:nvGrpSpPr>
+        <p:cNvPr id="1" name=""/>
+        <p:cNvGrpSpPr/>
+        <p:nvPr/>
+      </p:nvGrpSpPr>
+      <p:grpSpPr>
+        <a:xfrm>
+          <a:off x="0" y="0"/>
+          <a:ext cx="0" cy="0"/>
+          <a:chOff x="0" y="0"/>
+          <a:chExt cx="0" cy="0"/>
+        </a:xfrm>
+      </p:grpSpPr>
+      <p:sp>
+        <p:nvSpPr>
+          <p:cNvPr id="2" name="Slide Image Placeholder 1"/>
+          <p:cNvSpPr>
+            <a:spLocks noGrp="1" noRot="1" noChangeAspect="1"/>
+          </p:cNvSpPr>
+          <p:nvPr>
+            <p:ph type="sldImg"/>
+          </p:nvPr>
+        </p:nvSpPr>
+        <p:spPr/>
+      </p:sp>
+      <p:sp>
+        <p:nvSpPr>
+          <p:cNvPr id="3" name="Notes Placeholder 2"/>
+          <p:cNvSpPr>
+            <a:spLocks noGrp="1"/>
+          </p:cNvSpPr>
+          <p:nvPr>
+            <p:ph type="body" idx="1"/>
+          </p:nvPr>
+        </p:nvSpPr>
+        <p:spPr/>
+        <p:txBody>
+          <a:bodyPr/>
+          <a:lstStyle/>
+          <a:p>
+            <a:r>
+              <a:rPr lang="en-US" dirty="0"/>
+              <a:t/>
+            </a:r>
+            <a:endParaRPr lang="en-US" dirty="0"/>
+          </a:p>
+        </p:txBody>
+      </p:sp>
+      <p:sp>
+        <p:nvSpPr>
+          <p:cNvPr id="4" name="Slide Number Placeholder 3"/>
+          <p:cNvSpPr>
+            <a:spLocks noGrp="1"/>
+          </p:cNvSpPr>
+          <p:nvPr>
+            <p:ph type="sldNum" sz="quarter" idx="10"/>
+          </p:nvPr>
+        </p:nvSpPr>
+        <p:spPr/>
+        <p:txBody>
+          <a:bodyPr/>
+          <a:lstStyle/>
+          <a:p>
+            <a:fld id="{F7021451-1387-4CA6-816F-3879F97B5CBC}" type="slidenum">
+              <a:rPr lang="en-US"/>
+              <a:t>11</a:t>
+            </a:fld>
+            <a:endParaRPr lang="en-US"/>
+          </a:p>
+        </p:txBody>
+      </p:sp>
+    </p:spTree>
+    <p:extLst>
+      <p:ext uri="{BB962C8B-B14F-4D97-AF65-F5344CB8AC3E}">
+        <p14:creationId xmlns:p14="http://schemas.microsoft.com/office/powerpoint/2010/main" val="1024086991"/>
+      </p:ext>
+    </p:extLst>
+  </p:cSld>
+  <p:clrMapOvr>
+    <a:masterClrMapping/>
+  </p:clrMapOvr>
+</p:notes>
+</file>
+
+<file path=ppt/notesSlides/notesSlide12.xml><?xml version="1.0" encoding="utf-8"?>
+<p:notes xmlns:a="http://schemas.openxmlformats.org/drawingml/2006/main" xmlns:r="http://schemas.openxmlformats.org/officeDocument/2006/relationships" xmlns:p="http://schemas.openxmlformats.org/presentationml/2006/main">
+  <p:cSld>
+    <p:spTree>
+      <p:nvGrpSpPr>
+        <p:cNvPr id="1" name=""/>
+        <p:cNvGrpSpPr/>
+        <p:nvPr/>
+      </p:nvGrpSpPr>
+      <p:grpSpPr>
+        <a:xfrm>
+          <a:off x="0" y="0"/>
+          <a:ext cx="0" cy="0"/>
+          <a:chOff x="0" y="0"/>
+          <a:chExt cx="0" cy="0"/>
+        </a:xfrm>
+      </p:grpSpPr>
+      <p:sp>
+        <p:nvSpPr>
+          <p:cNvPr id="2" name="Slide Image Placeholder 1"/>
+          <p:cNvSpPr>
+            <a:spLocks noGrp="1" noRot="1" noChangeAspect="1"/>
+          </p:cNvSpPr>
+          <p:nvPr>
+            <p:ph type="sldImg"/>
+          </p:nvPr>
+        </p:nvSpPr>
+        <p:spPr/>
+      </p:sp>
+      <p:sp>
+        <p:nvSpPr>
+          <p:cNvPr id="3" name="Notes Placeholder 2"/>
+          <p:cNvSpPr>
+            <a:spLocks noGrp="1"/>
+          </p:cNvSpPr>
+          <p:nvPr>
+            <p:ph type="body" idx="1"/>
+          </p:nvPr>
+        </p:nvSpPr>
+        <p:spPr/>
+        <p:txBody>
+          <a:bodyPr/>
+          <a:lstStyle/>
+          <a:p>
+            <a:r>
+              <a:rPr lang="en-US" dirty="0"/>
+              <a:t/>
+            </a:r>
+            <a:endParaRPr lang="en-US" dirty="0"/>
+          </a:p>
+        </p:txBody>
+      </p:sp>
+      <p:sp>
+        <p:nvSpPr>
+          <p:cNvPr id="4" name="Slide Number Placeholder 3"/>
+          <p:cNvSpPr>
+            <a:spLocks noGrp="1"/>
+          </p:cNvSpPr>
+          <p:nvPr>
+            <p:ph type="sldNum" sz="quarter" idx="10"/>
+          </p:nvPr>
+        </p:nvSpPr>
+        <p:spPr/>
+        <p:txBody>
+          <a:bodyPr/>
+          <a:lstStyle/>
+          <a:p>
+            <a:fld id="{F7021451-1387-4CA6-816F-3879F97B5CBC}" type="slidenum">
+              <a:rPr lang="en-US"/>
+              <a:t>12</a:t>
             </a:fld>
             <a:endParaRPr lang="en-US"/>
           </a:p>
@@ -1569,6 +1836,123 @@
 <file path=ppt/slides/slide1.xml><?xml version="1.0" encoding="utf-8"?>
 <p:sld xmlns:a="http://schemas.openxmlformats.org/drawingml/2006/main" xmlns:r="http://schemas.openxmlformats.org/officeDocument/2006/relationships" xmlns:p="http://schemas.openxmlformats.org/presentationml/2006/main">
   <p:cSld name="Slide 1">
+    <p:bg>
+      <p:bgPr>
+        <a:blipFill dpi="0" rotWithShape="1">
+          <a:blip r:embed="rId1">
+            <a:lum/>
+          </a:blip>
+          <a:srcRect/>
+          <a:stretch>
+            <a:fillRect/>
+          </a:stretch>
+        </a:blipFill>
+        <a:effectLst/>
+      </p:bgPr>
+    </p:bg>
+    <p:spTree>
+      <p:nvGrpSpPr>
+        <p:cNvPr id="1" name=""/>
+        <p:cNvGrpSpPr/>
+        <p:nvPr/>
+      </p:nvGrpSpPr>
+      <p:grpSpPr>
+        <a:xfrm>
+          <a:off x="0" y="0"/>
+          <a:ext cx="0" cy="0"/>
+          <a:chOff x="0" y="0"/>
+          <a:chExt cx="0" cy="0"/>
+        </a:xfrm>
+      </p:grpSpPr>
+    </p:spTree>
+  </p:cSld>
+  <p:clrMapOvr>
+    <a:masterClrMapping/>
+  </p:clrMapOvr>
+</p:sld>
+</file>
+
+<file path=ppt/slides/slide10.xml><?xml version="1.0" encoding="utf-8"?>
+<p:sld xmlns:a="http://schemas.openxmlformats.org/drawingml/2006/main" xmlns:r="http://schemas.openxmlformats.org/officeDocument/2006/relationships" xmlns:p="http://schemas.openxmlformats.org/presentationml/2006/main">
+  <p:cSld name="Slide 10">
+    <p:bg>
+      <p:bgPr>
+        <a:blipFill dpi="0" rotWithShape="1">
+          <a:blip r:embed="rId1">
+            <a:lum/>
+          </a:blip>
+          <a:srcRect/>
+          <a:stretch>
+            <a:fillRect/>
+          </a:stretch>
+        </a:blipFill>
+        <a:effectLst/>
+      </p:bgPr>
+    </p:bg>
+    <p:spTree>
+      <p:nvGrpSpPr>
+        <p:cNvPr id="1" name=""/>
+        <p:cNvGrpSpPr/>
+        <p:nvPr/>
+      </p:nvGrpSpPr>
+      <p:grpSpPr>
+        <a:xfrm>
+          <a:off x="0" y="0"/>
+          <a:ext cx="0" cy="0"/>
+          <a:chOff x="0" y="0"/>
+          <a:chExt cx="0" cy="0"/>
+        </a:xfrm>
+      </p:grpSpPr>
+    </p:spTree>
+  </p:cSld>
+  <p:clrMapOvr>
+    <a:masterClrMapping/>
+  </p:clrMapOvr>
+</p:sld>
+</file>
+
+<file path=ppt/slides/slide11.xml><?xml version="1.0" encoding="utf-8"?>
+<p:sld xmlns:a="http://schemas.openxmlformats.org/drawingml/2006/main" xmlns:r="http://schemas.openxmlformats.org/officeDocument/2006/relationships" xmlns:p="http://schemas.openxmlformats.org/presentationml/2006/main">
+  <p:cSld name="Slide 11">
+    <p:bg>
+      <p:bgPr>
+        <a:blipFill dpi="0" rotWithShape="1">
+          <a:blip r:embed="rId1">
+            <a:lum/>
+          </a:blip>
+          <a:srcRect/>
+          <a:stretch>
+            <a:fillRect/>
+          </a:stretch>
+        </a:blipFill>
+        <a:effectLst/>
+      </p:bgPr>
+    </p:bg>
+    <p:spTree>
+      <p:nvGrpSpPr>
+        <p:cNvPr id="1" name=""/>
+        <p:cNvGrpSpPr/>
+        <p:nvPr/>
+      </p:nvGrpSpPr>
+      <p:grpSpPr>
+        <a:xfrm>
+          <a:off x="0" y="0"/>
+          <a:ext cx="0" cy="0"/>
+          <a:chOff x="0" y="0"/>
+          <a:chExt cx="0" cy="0"/>
+        </a:xfrm>
+      </p:grpSpPr>
+    </p:spTree>
+  </p:cSld>
+  <p:clrMapOvr>
+    <a:masterClrMapping/>
+  </p:clrMapOvr>
+</p:sld>
+</file>
+
+<file path=ppt/slides/slide12.xml><?xml version="1.0" encoding="utf-8"?>
+<p:sld xmlns:a="http://schemas.openxmlformats.org/drawingml/2006/main" xmlns:r="http://schemas.openxmlformats.org/officeDocument/2006/relationships" xmlns:p="http://schemas.openxmlformats.org/presentationml/2006/main">
+  <p:cSld name="Slide 12">
     <p:bg>
       <p:bgPr>
         <a:blipFill dpi="0" rotWithShape="1">

</xml_diff>